<commit_message>
working on histogram comparisons
</commit_message>
<xml_diff>
--- a/Master thesis/Meetings/26-02 Integrating gpaw and model, and comparing histograms.pptx
+++ b/Master thesis/Meetings/26-02 Integrating gpaw and model, and comparing histograms.pptx
@@ -137,7 +137,7 @@
   <pc:docChgLst>
     <pc:chgData name="Birk Nøhr Dissing" userId="9f16f90f-bd2a-4063-a72f-deae502fc0f4" providerId="ADAL" clId="{CB2D36CA-AA1A-44C8-BEF7-7DCB60A55F19}"/>
     <pc:docChg chg="custSel addSld delSld modSld">
-      <pc:chgData name="Birk Nøhr Dissing" userId="9f16f90f-bd2a-4063-a72f-deae502fc0f4" providerId="ADAL" clId="{CB2D36CA-AA1A-44C8-BEF7-7DCB60A55F19}" dt="2024-02-23T11:43:40.546" v="242" actId="1076"/>
+      <pc:chgData name="Birk Nøhr Dissing" userId="9f16f90f-bd2a-4063-a72f-deae502fc0f4" providerId="ADAL" clId="{CB2D36CA-AA1A-44C8-BEF7-7DCB60A55F19}" dt="2024-02-26T09:17:26.980" v="282" actId="1076"/>
       <pc:docMkLst>
         <pc:docMk/>
       </pc:docMkLst>
@@ -401,6 +401,51 @@
           </ac:picMkLst>
         </pc:picChg>
       </pc:sldChg>
+      <pc:sldChg chg="modSp mod">
+        <pc:chgData name="Birk Nøhr Dissing" userId="9f16f90f-bd2a-4063-a72f-deae502fc0f4" providerId="ADAL" clId="{CB2D36CA-AA1A-44C8-BEF7-7DCB60A55F19}" dt="2024-02-26T09:17:26.980" v="282" actId="1076"/>
+        <pc:sldMkLst>
+          <pc:docMk/>
+          <pc:sldMk cId="3050926040" sldId="270"/>
+        </pc:sldMkLst>
+        <pc:picChg chg="mod">
+          <ac:chgData name="Birk Nøhr Dissing" userId="9f16f90f-bd2a-4063-a72f-deae502fc0f4" providerId="ADAL" clId="{CB2D36CA-AA1A-44C8-BEF7-7DCB60A55F19}" dt="2024-02-26T09:17:26.980" v="282" actId="1076"/>
+          <ac:picMkLst>
+            <pc:docMk/>
+            <pc:sldMk cId="3050926040" sldId="270"/>
+            <ac:picMk id="5" creationId="{BF451CC4-B980-90A5-2BEB-1310C08DE283}"/>
+          </ac:picMkLst>
+        </pc:picChg>
+      </pc:sldChg>
+      <pc:sldChg chg="modSp mod">
+        <pc:chgData name="Birk Nøhr Dissing" userId="9f16f90f-bd2a-4063-a72f-deae502fc0f4" providerId="ADAL" clId="{CB2D36CA-AA1A-44C8-BEF7-7DCB60A55F19}" dt="2024-02-26T09:06:18.998" v="244" actId="20577"/>
+        <pc:sldMkLst>
+          <pc:docMk/>
+          <pc:sldMk cId="1063099091" sldId="272"/>
+        </pc:sldMkLst>
+        <pc:spChg chg="mod">
+          <ac:chgData name="Birk Nøhr Dissing" userId="9f16f90f-bd2a-4063-a72f-deae502fc0f4" providerId="ADAL" clId="{CB2D36CA-AA1A-44C8-BEF7-7DCB60A55F19}" dt="2024-02-26T09:06:18.998" v="244" actId="20577"/>
+          <ac:spMkLst>
+            <pc:docMk/>
+            <pc:sldMk cId="1063099091" sldId="272"/>
+            <ac:spMk id="2" creationId="{F205379A-F645-452F-98B7-B206163F2B80}"/>
+          </ac:spMkLst>
+        </pc:spChg>
+      </pc:sldChg>
+      <pc:sldChg chg="modSp mod">
+        <pc:chgData name="Birk Nøhr Dissing" userId="9f16f90f-bd2a-4063-a72f-deae502fc0f4" providerId="ADAL" clId="{CB2D36CA-AA1A-44C8-BEF7-7DCB60A55F19}" dt="2024-02-26T09:06:40.883" v="280" actId="20577"/>
+        <pc:sldMkLst>
+          <pc:docMk/>
+          <pc:sldMk cId="2682423451" sldId="273"/>
+        </pc:sldMkLst>
+        <pc:spChg chg="mod">
+          <ac:chgData name="Birk Nøhr Dissing" userId="9f16f90f-bd2a-4063-a72f-deae502fc0f4" providerId="ADAL" clId="{CB2D36CA-AA1A-44C8-BEF7-7DCB60A55F19}" dt="2024-02-26T09:06:40.883" v="280" actId="20577"/>
+          <ac:spMkLst>
+            <pc:docMk/>
+            <pc:sldMk cId="2682423451" sldId="273"/>
+            <ac:spMk id="2" creationId="{40003C9C-9302-C932-4B22-8451BE000B8A}"/>
+          </ac:spMkLst>
+        </pc:spChg>
+      </pc:sldChg>
     </pc:docChg>
   </pc:docChgLst>
 </pc:chgInfo>
@@ -553,7 +598,7 @@
           <a:p>
             <a:fld id="{EB96CC9F-F931-4751-9BDE-A749136C9C15}" type="datetimeFigureOut">
               <a:rPr lang="da-DK" smtClean="0"/>
-              <a:t>25-02-2024</a:t>
+              <a:t>26-02-2024</a:t>
             </a:fld>
             <a:endParaRPr lang="da-DK"/>
           </a:p>
@@ -607,7 +652,7 @@
           <a:p>
             <a:fld id="{7BE005B4-57FF-4D1F-9A11-DC5A69DDB4CD}" type="slidenum">
               <a:rPr lang="da-DK" smtClean="0"/>
-              <a:t>‹#›</a:t>
+              <a:t>‹nr.›</a:t>
             </a:fld>
             <a:endParaRPr lang="da-DK"/>
           </a:p>
@@ -751,7 +796,7 @@
           <a:p>
             <a:fld id="{EB96CC9F-F931-4751-9BDE-A749136C9C15}" type="datetimeFigureOut">
               <a:rPr lang="da-DK" smtClean="0"/>
-              <a:t>25-02-2024</a:t>
+              <a:t>26-02-2024</a:t>
             </a:fld>
             <a:endParaRPr lang="da-DK"/>
           </a:p>
@@ -805,7 +850,7 @@
           <a:p>
             <a:fld id="{7BE005B4-57FF-4D1F-9A11-DC5A69DDB4CD}" type="slidenum">
               <a:rPr lang="da-DK" smtClean="0"/>
-              <a:t>‹#›</a:t>
+              <a:t>‹nr.›</a:t>
             </a:fld>
             <a:endParaRPr lang="da-DK"/>
           </a:p>
@@ -959,7 +1004,7 @@
           <a:p>
             <a:fld id="{EB96CC9F-F931-4751-9BDE-A749136C9C15}" type="datetimeFigureOut">
               <a:rPr lang="da-DK" smtClean="0"/>
-              <a:t>25-02-2024</a:t>
+              <a:t>26-02-2024</a:t>
             </a:fld>
             <a:endParaRPr lang="da-DK"/>
           </a:p>
@@ -1013,7 +1058,7 @@
           <a:p>
             <a:fld id="{7BE005B4-57FF-4D1F-9A11-DC5A69DDB4CD}" type="slidenum">
               <a:rPr lang="da-DK" smtClean="0"/>
-              <a:t>‹#›</a:t>
+              <a:t>‹nr.›</a:t>
             </a:fld>
             <a:endParaRPr lang="da-DK"/>
           </a:p>
@@ -1157,7 +1202,7 @@
           <a:p>
             <a:fld id="{EB96CC9F-F931-4751-9BDE-A749136C9C15}" type="datetimeFigureOut">
               <a:rPr lang="da-DK" smtClean="0"/>
-              <a:t>25-02-2024</a:t>
+              <a:t>26-02-2024</a:t>
             </a:fld>
             <a:endParaRPr lang="da-DK"/>
           </a:p>
@@ -1211,7 +1256,7 @@
           <a:p>
             <a:fld id="{7BE005B4-57FF-4D1F-9A11-DC5A69DDB4CD}" type="slidenum">
               <a:rPr lang="da-DK" smtClean="0"/>
-              <a:t>‹#›</a:t>
+              <a:t>‹nr.›</a:t>
             </a:fld>
             <a:endParaRPr lang="da-DK"/>
           </a:p>
@@ -1432,7 +1477,7 @@
           <a:p>
             <a:fld id="{EB96CC9F-F931-4751-9BDE-A749136C9C15}" type="datetimeFigureOut">
               <a:rPr lang="da-DK" smtClean="0"/>
-              <a:t>25-02-2024</a:t>
+              <a:t>26-02-2024</a:t>
             </a:fld>
             <a:endParaRPr lang="da-DK"/>
           </a:p>
@@ -1486,7 +1531,7 @@
           <a:p>
             <a:fld id="{7BE005B4-57FF-4D1F-9A11-DC5A69DDB4CD}" type="slidenum">
               <a:rPr lang="da-DK" smtClean="0"/>
-              <a:t>‹#›</a:t>
+              <a:t>‹nr.›</a:t>
             </a:fld>
             <a:endParaRPr lang="da-DK"/>
           </a:p>
@@ -1697,7 +1742,7 @@
           <a:p>
             <a:fld id="{EB96CC9F-F931-4751-9BDE-A749136C9C15}" type="datetimeFigureOut">
               <a:rPr lang="da-DK" smtClean="0"/>
-              <a:t>25-02-2024</a:t>
+              <a:t>26-02-2024</a:t>
             </a:fld>
             <a:endParaRPr lang="da-DK"/>
           </a:p>
@@ -1751,7 +1796,7 @@
           <a:p>
             <a:fld id="{7BE005B4-57FF-4D1F-9A11-DC5A69DDB4CD}" type="slidenum">
               <a:rPr lang="da-DK" smtClean="0"/>
-              <a:t>‹#›</a:t>
+              <a:t>‹nr.›</a:t>
             </a:fld>
             <a:endParaRPr lang="da-DK"/>
           </a:p>
@@ -2109,7 +2154,7 @@
           <a:p>
             <a:fld id="{EB96CC9F-F931-4751-9BDE-A749136C9C15}" type="datetimeFigureOut">
               <a:rPr lang="da-DK" smtClean="0"/>
-              <a:t>25-02-2024</a:t>
+              <a:t>26-02-2024</a:t>
             </a:fld>
             <a:endParaRPr lang="da-DK"/>
           </a:p>
@@ -2163,7 +2208,7 @@
           <a:p>
             <a:fld id="{7BE005B4-57FF-4D1F-9A11-DC5A69DDB4CD}" type="slidenum">
               <a:rPr lang="da-DK" smtClean="0"/>
-              <a:t>‹#›</a:t>
+              <a:t>‹nr.›</a:t>
             </a:fld>
             <a:endParaRPr lang="da-DK"/>
           </a:p>
@@ -2250,7 +2295,7 @@
           <a:p>
             <a:fld id="{EB96CC9F-F931-4751-9BDE-A749136C9C15}" type="datetimeFigureOut">
               <a:rPr lang="da-DK" smtClean="0"/>
-              <a:t>25-02-2024</a:t>
+              <a:t>26-02-2024</a:t>
             </a:fld>
             <a:endParaRPr lang="da-DK"/>
           </a:p>
@@ -2304,7 +2349,7 @@
           <a:p>
             <a:fld id="{7BE005B4-57FF-4D1F-9A11-DC5A69DDB4CD}" type="slidenum">
               <a:rPr lang="da-DK" smtClean="0"/>
-              <a:t>‹#›</a:t>
+              <a:t>‹nr.›</a:t>
             </a:fld>
             <a:endParaRPr lang="da-DK"/>
           </a:p>
@@ -2363,7 +2408,7 @@
           <a:p>
             <a:fld id="{EB96CC9F-F931-4751-9BDE-A749136C9C15}" type="datetimeFigureOut">
               <a:rPr lang="da-DK" smtClean="0"/>
-              <a:t>25-02-2024</a:t>
+              <a:t>26-02-2024</a:t>
             </a:fld>
             <a:endParaRPr lang="da-DK"/>
           </a:p>
@@ -2417,7 +2462,7 @@
           <a:p>
             <a:fld id="{7BE005B4-57FF-4D1F-9A11-DC5A69DDB4CD}" type="slidenum">
               <a:rPr lang="da-DK" smtClean="0"/>
-              <a:t>‹#›</a:t>
+              <a:t>‹nr.›</a:t>
             </a:fld>
             <a:endParaRPr lang="da-DK"/>
           </a:p>
@@ -2674,7 +2719,7 @@
           <a:p>
             <a:fld id="{EB96CC9F-F931-4751-9BDE-A749136C9C15}" type="datetimeFigureOut">
               <a:rPr lang="da-DK" smtClean="0"/>
-              <a:t>25-02-2024</a:t>
+              <a:t>26-02-2024</a:t>
             </a:fld>
             <a:endParaRPr lang="da-DK"/>
           </a:p>
@@ -2728,7 +2773,7 @@
           <a:p>
             <a:fld id="{7BE005B4-57FF-4D1F-9A11-DC5A69DDB4CD}" type="slidenum">
               <a:rPr lang="da-DK" smtClean="0"/>
-              <a:t>‹#›</a:t>
+              <a:t>‹nr.›</a:t>
             </a:fld>
             <a:endParaRPr lang="da-DK"/>
           </a:p>
@@ -2962,7 +3007,7 @@
           <a:p>
             <a:fld id="{EB96CC9F-F931-4751-9BDE-A749136C9C15}" type="datetimeFigureOut">
               <a:rPr lang="da-DK" smtClean="0"/>
-              <a:t>25-02-2024</a:t>
+              <a:t>26-02-2024</a:t>
             </a:fld>
             <a:endParaRPr lang="da-DK"/>
           </a:p>
@@ -3016,7 +3061,7 @@
           <a:p>
             <a:fld id="{7BE005B4-57FF-4D1F-9A11-DC5A69DDB4CD}" type="slidenum">
               <a:rPr lang="da-DK" smtClean="0"/>
-              <a:t>‹#›</a:t>
+              <a:t>‹nr.›</a:t>
             </a:fld>
             <a:endParaRPr lang="da-DK"/>
           </a:p>
@@ -3203,7 +3248,7 @@
           <a:p>
             <a:fld id="{EB96CC9F-F931-4751-9BDE-A749136C9C15}" type="datetimeFigureOut">
               <a:rPr lang="da-DK" smtClean="0"/>
-              <a:t>25-02-2024</a:t>
+              <a:t>26-02-2024</a:t>
             </a:fld>
             <a:endParaRPr lang="da-DK"/>
           </a:p>
@@ -3293,7 +3338,7 @@
           <a:p>
             <a:fld id="{7BE005B4-57FF-4D1F-9A11-DC5A69DDB4CD}" type="slidenum">
               <a:rPr lang="da-DK" smtClean="0"/>
-              <a:t>‹#›</a:t>
+              <a:t>‹nr.›</a:t>
             </a:fld>
             <a:endParaRPr lang="da-DK"/>
           </a:p>
@@ -4027,7 +4072,10 @@
           <a:bodyPr/>
           <a:lstStyle/>
           <a:p>
-            <a:endParaRPr lang="en-GB"/>
+            <a:r>
+              <a:rPr lang="en-GB" dirty="0"/>
+              <a:t>Future data analysis</a:t>
+            </a:r>
           </a:p>
         </p:txBody>
       </p:sp>
@@ -4935,8 +4983,8 @@
         </p:blipFill>
         <p:spPr>
           <a:xfrm>
-            <a:off x="998375" y="1446944"/>
-            <a:ext cx="9131889" cy="4696188"/>
+            <a:off x="555315" y="0"/>
+            <a:ext cx="12092163" cy="6218546"/>
           </a:xfrm>
           <a:prstGeom prst="rect">
             <a:avLst/>
@@ -5269,7 +5317,7 @@
           <a:p>
             <a:r>
               <a:rPr lang="da-DK" dirty="0"/>
-              <a:t>Forces does not get updated</a:t>
+              <a:t>Forces do not get updated</a:t>
             </a:r>
             <a:endParaRPr lang="en-GB" dirty="0"/>
           </a:p>

</xml_diff>